<commit_message>
Fixed Example, and harmonised Formalisation accordingly (mostly, PCAD => CCAD)
</commit_message>
<xml_diff>
--- a/img/CookieCAD.pptx
+++ b/img/CookieCAD.pptx
@@ -104,6 +104,11 @@
       </a:defRPr>
     </a:lvl9pPr>
   </p:defaultTextStyle>
+  <p:extLst>
+    <p:ext uri="{EFAFB233-063F-42B5-8137-9DF3F51BA10A}">
+      <p15:sldGuideLst xmlns:p15="http://schemas.microsoft.com/office/powerpoint/2012/main"/>
+    </p:ext>
+  </p:extLst>
 </p:presentation>
 </file>
 
@@ -238,7 +243,7 @@
           <a:p>
             <a:fld id="{88D8086B-8956-4395-8472-C2A29D422F5B}" type="datetimeFigureOut">
               <a:rPr lang="de-DE" smtClean="0"/>
-              <a:t>01.07.2019</a:t>
+              <a:t>03.07.2019</a:t>
             </a:fld>
             <a:endParaRPr lang="de-DE"/>
           </a:p>
@@ -280,7 +285,7 @@
           <a:p>
             <a:fld id="{0B581A30-7E4F-4EB3-A199-549B1F26C1CE}" type="slidenum">
               <a:rPr lang="de-DE" smtClean="0"/>
-              <a:t>‹Nr.›</a:t>
+              <a:t>‹#›</a:t>
             </a:fld>
             <a:endParaRPr lang="de-DE"/>
           </a:p>
@@ -408,7 +413,7 @@
           <a:p>
             <a:fld id="{88D8086B-8956-4395-8472-C2A29D422F5B}" type="datetimeFigureOut">
               <a:rPr lang="de-DE" smtClean="0"/>
-              <a:t>01.07.2019</a:t>
+              <a:t>03.07.2019</a:t>
             </a:fld>
             <a:endParaRPr lang="de-DE"/>
           </a:p>
@@ -450,7 +455,7 @@
           <a:p>
             <a:fld id="{0B581A30-7E4F-4EB3-A199-549B1F26C1CE}" type="slidenum">
               <a:rPr lang="de-DE" smtClean="0"/>
-              <a:t>‹Nr.›</a:t>
+              <a:t>‹#›</a:t>
             </a:fld>
             <a:endParaRPr lang="de-DE"/>
           </a:p>
@@ -588,7 +593,7 @@
           <a:p>
             <a:fld id="{88D8086B-8956-4395-8472-C2A29D422F5B}" type="datetimeFigureOut">
               <a:rPr lang="de-DE" smtClean="0"/>
-              <a:t>01.07.2019</a:t>
+              <a:t>03.07.2019</a:t>
             </a:fld>
             <a:endParaRPr lang="de-DE"/>
           </a:p>
@@ -630,7 +635,7 @@
           <a:p>
             <a:fld id="{0B581A30-7E4F-4EB3-A199-549B1F26C1CE}" type="slidenum">
               <a:rPr lang="de-DE" smtClean="0"/>
-              <a:t>‹Nr.›</a:t>
+              <a:t>‹#›</a:t>
             </a:fld>
             <a:endParaRPr lang="de-DE"/>
           </a:p>
@@ -758,7 +763,7 @@
           <a:p>
             <a:fld id="{88D8086B-8956-4395-8472-C2A29D422F5B}" type="datetimeFigureOut">
               <a:rPr lang="de-DE" smtClean="0"/>
-              <a:t>01.07.2019</a:t>
+              <a:t>03.07.2019</a:t>
             </a:fld>
             <a:endParaRPr lang="de-DE"/>
           </a:p>
@@ -800,7 +805,7 @@
           <a:p>
             <a:fld id="{0B581A30-7E4F-4EB3-A199-549B1F26C1CE}" type="slidenum">
               <a:rPr lang="de-DE" smtClean="0"/>
-              <a:t>‹Nr.›</a:t>
+              <a:t>‹#›</a:t>
             </a:fld>
             <a:endParaRPr lang="de-DE"/>
           </a:p>
@@ -1004,7 +1009,7 @@
           <a:p>
             <a:fld id="{88D8086B-8956-4395-8472-C2A29D422F5B}" type="datetimeFigureOut">
               <a:rPr lang="de-DE" smtClean="0"/>
-              <a:t>01.07.2019</a:t>
+              <a:t>03.07.2019</a:t>
             </a:fld>
             <a:endParaRPr lang="de-DE"/>
           </a:p>
@@ -1046,7 +1051,7 @@
           <a:p>
             <a:fld id="{0B581A30-7E4F-4EB3-A199-549B1F26C1CE}" type="slidenum">
               <a:rPr lang="de-DE" smtClean="0"/>
-              <a:t>‹Nr.›</a:t>
+              <a:t>‹#›</a:t>
             </a:fld>
             <a:endParaRPr lang="de-DE"/>
           </a:p>
@@ -1236,7 +1241,7 @@
           <a:p>
             <a:fld id="{88D8086B-8956-4395-8472-C2A29D422F5B}" type="datetimeFigureOut">
               <a:rPr lang="de-DE" smtClean="0"/>
-              <a:t>01.07.2019</a:t>
+              <a:t>03.07.2019</a:t>
             </a:fld>
             <a:endParaRPr lang="de-DE"/>
           </a:p>
@@ -1278,7 +1283,7 @@
           <a:p>
             <a:fld id="{0B581A30-7E4F-4EB3-A199-549B1F26C1CE}" type="slidenum">
               <a:rPr lang="de-DE" smtClean="0"/>
-              <a:t>‹Nr.›</a:t>
+              <a:t>‹#›</a:t>
             </a:fld>
             <a:endParaRPr lang="de-DE"/>
           </a:p>
@@ -1603,7 +1608,7 @@
           <a:p>
             <a:fld id="{88D8086B-8956-4395-8472-C2A29D422F5B}" type="datetimeFigureOut">
               <a:rPr lang="de-DE" smtClean="0"/>
-              <a:t>01.07.2019</a:t>
+              <a:t>03.07.2019</a:t>
             </a:fld>
             <a:endParaRPr lang="de-DE"/>
           </a:p>
@@ -1645,7 +1650,7 @@
           <a:p>
             <a:fld id="{0B581A30-7E4F-4EB3-A199-549B1F26C1CE}" type="slidenum">
               <a:rPr lang="de-DE" smtClean="0"/>
-              <a:t>‹Nr.›</a:t>
+              <a:t>‹#›</a:t>
             </a:fld>
             <a:endParaRPr lang="de-DE"/>
           </a:p>
@@ -1721,7 +1726,7 @@
           <a:p>
             <a:fld id="{88D8086B-8956-4395-8472-C2A29D422F5B}" type="datetimeFigureOut">
               <a:rPr lang="de-DE" smtClean="0"/>
-              <a:t>01.07.2019</a:t>
+              <a:t>03.07.2019</a:t>
             </a:fld>
             <a:endParaRPr lang="de-DE"/>
           </a:p>
@@ -1763,7 +1768,7 @@
           <a:p>
             <a:fld id="{0B581A30-7E4F-4EB3-A199-549B1F26C1CE}" type="slidenum">
               <a:rPr lang="de-DE" smtClean="0"/>
-              <a:t>‹Nr.›</a:t>
+              <a:t>‹#›</a:t>
             </a:fld>
             <a:endParaRPr lang="de-DE"/>
           </a:p>
@@ -1816,7 +1821,7 @@
           <a:p>
             <a:fld id="{88D8086B-8956-4395-8472-C2A29D422F5B}" type="datetimeFigureOut">
               <a:rPr lang="de-DE" smtClean="0"/>
-              <a:t>01.07.2019</a:t>
+              <a:t>03.07.2019</a:t>
             </a:fld>
             <a:endParaRPr lang="de-DE"/>
           </a:p>
@@ -1858,7 +1863,7 @@
           <a:p>
             <a:fld id="{0B581A30-7E4F-4EB3-A199-549B1F26C1CE}" type="slidenum">
               <a:rPr lang="de-DE" smtClean="0"/>
-              <a:t>‹Nr.›</a:t>
+              <a:t>‹#›</a:t>
             </a:fld>
             <a:endParaRPr lang="de-DE"/>
           </a:p>
@@ -2093,7 +2098,7 @@
           <a:p>
             <a:fld id="{88D8086B-8956-4395-8472-C2A29D422F5B}" type="datetimeFigureOut">
               <a:rPr lang="de-DE" smtClean="0"/>
-              <a:t>01.07.2019</a:t>
+              <a:t>03.07.2019</a:t>
             </a:fld>
             <a:endParaRPr lang="de-DE"/>
           </a:p>
@@ -2135,7 +2140,7 @@
           <a:p>
             <a:fld id="{0B581A30-7E4F-4EB3-A199-549B1F26C1CE}" type="slidenum">
               <a:rPr lang="de-DE" smtClean="0"/>
-              <a:t>‹Nr.›</a:t>
+              <a:t>‹#›</a:t>
             </a:fld>
             <a:endParaRPr lang="de-DE"/>
           </a:p>
@@ -2350,7 +2355,7 @@
           <a:p>
             <a:fld id="{88D8086B-8956-4395-8472-C2A29D422F5B}" type="datetimeFigureOut">
               <a:rPr lang="de-DE" smtClean="0"/>
-              <a:t>01.07.2019</a:t>
+              <a:t>03.07.2019</a:t>
             </a:fld>
             <a:endParaRPr lang="de-DE"/>
           </a:p>
@@ -2392,7 +2397,7 @@
           <a:p>
             <a:fld id="{0B581A30-7E4F-4EB3-A199-549B1F26C1CE}" type="slidenum">
               <a:rPr lang="de-DE" smtClean="0"/>
-              <a:t>‹Nr.›</a:t>
+              <a:t>‹#›</a:t>
             </a:fld>
             <a:endParaRPr lang="de-DE"/>
           </a:p>
@@ -2563,7 +2568,7 @@
           <a:p>
             <a:fld id="{88D8086B-8956-4395-8472-C2A29D422F5B}" type="datetimeFigureOut">
               <a:rPr lang="de-DE" smtClean="0"/>
-              <a:t>01.07.2019</a:t>
+              <a:t>03.07.2019</a:t>
             </a:fld>
             <a:endParaRPr lang="de-DE"/>
           </a:p>
@@ -2641,7 +2646,7 @@
           <a:p>
             <a:fld id="{0B581A30-7E4F-4EB3-A199-549B1F26C1CE}" type="slidenum">
               <a:rPr lang="de-DE" smtClean="0"/>
-              <a:t>‹Nr.›</a:t>
+              <a:t>‹#›</a:t>
             </a:fld>
             <a:endParaRPr lang="de-DE"/>
           </a:p>
@@ -3269,60 +3274,6 @@
       </p:sp>
       <p:sp>
         <p:nvSpPr>
-          <p:cNvPr id="11" name="Gleichschenkliges Dreieck 10">
-            <a:extLst>
-              <a:ext uri="{FF2B5EF4-FFF2-40B4-BE49-F238E27FC236}">
-                <a16:creationId xmlns:a16="http://schemas.microsoft.com/office/drawing/2014/main" id="{57FA2E60-DA10-4355-BEED-3D3DB8F06F4C}"/>
-              </a:ext>
-            </a:extLst>
-          </p:cNvPr>
-          <p:cNvSpPr/>
-          <p:nvPr/>
-        </p:nvSpPr>
-        <p:spPr>
-          <a:xfrm>
-            <a:off x="2272620" y="463475"/>
-            <a:ext cx="1562100" cy="1285875"/>
-          </a:xfrm>
-          <a:prstGeom prst="triangle">
-            <a:avLst/>
-          </a:prstGeom>
-          <a:noFill/>
-          <a:ln w="25400">
-            <a:solidFill>
-              <a:schemeClr val="tx1"/>
-            </a:solidFill>
-            <a:prstDash val="solid"/>
-          </a:ln>
-          <a:effectLst/>
-        </p:spPr>
-        <p:style>
-          <a:lnRef idx="2">
-            <a:schemeClr val="accent1">
-              <a:shade val="50000"/>
-            </a:schemeClr>
-          </a:lnRef>
-          <a:fillRef idx="1">
-            <a:schemeClr val="accent1"/>
-          </a:fillRef>
-          <a:effectRef idx="0">
-            <a:schemeClr val="accent1"/>
-          </a:effectRef>
-          <a:fontRef idx="minor">
-            <a:schemeClr val="lt1"/>
-          </a:fontRef>
-        </p:style>
-        <p:txBody>
-          <a:bodyPr rtlCol="0" anchor="ctr"/>
-          <a:lstStyle/>
-          <a:p>
-            <a:pPr algn="ctr"/>
-            <a:endParaRPr lang="de-DE"/>
-          </a:p>
-        </p:txBody>
-      </p:sp>
-      <p:sp>
-        <p:nvSpPr>
           <p:cNvPr id="12" name="Flussdiagramm: Verbinder 11">
             <a:extLst>
               <a:ext uri="{FF2B5EF4-FFF2-40B4-BE49-F238E27FC236}">
@@ -3335,8 +3286,8 @@
         </p:nvSpPr>
         <p:spPr>
           <a:xfrm>
-            <a:off x="2244046" y="1669459"/>
-            <a:ext cx="114300" cy="127516"/>
+            <a:off x="2557361" y="978896"/>
+            <a:ext cx="72000" cy="72000"/>
           </a:xfrm>
           <a:prstGeom prst="flowChartConnector">
             <a:avLst/>
@@ -3389,8 +3340,8 @@
         </p:nvSpPr>
         <p:spPr>
           <a:xfrm>
-            <a:off x="3777570" y="1685592"/>
-            <a:ext cx="114300" cy="127516"/>
+            <a:off x="3339539" y="974889"/>
+            <a:ext cx="72000" cy="72000"/>
           </a:xfrm>
           <a:prstGeom prst="flowChartConnector">
             <a:avLst/>
@@ -3443,8 +3394,8 @@
         </p:nvSpPr>
         <p:spPr>
           <a:xfrm>
-            <a:off x="3010774" y="416921"/>
-            <a:ext cx="114300" cy="127516"/>
+            <a:off x="2948450" y="415850"/>
+            <a:ext cx="72000" cy="72000"/>
           </a:xfrm>
           <a:prstGeom prst="flowChartConnector">
             <a:avLst/>
@@ -4117,6 +4068,418 @@
           </a:p>
         </p:txBody>
       </p:sp>
+      <p:cxnSp>
+        <p:nvCxnSpPr>
+          <p:cNvPr id="3" name="Straight Connector 2"/>
+          <p:cNvCxnSpPr>
+            <a:stCxn id="14" idx="3"/>
+            <a:endCxn id="12" idx="7"/>
+          </p:cNvCxnSpPr>
+          <p:nvPr/>
+        </p:nvCxnSpPr>
+        <p:spPr>
+          <a:xfrm flipH="1">
+            <a:off x="2618817" y="477306"/>
+            <a:ext cx="340177" cy="512134"/>
+          </a:xfrm>
+          <a:prstGeom prst="line">
+            <a:avLst/>
+          </a:prstGeom>
+          <a:ln w="25400">
+            <a:solidFill>
+              <a:schemeClr val="tx1"/>
+            </a:solidFill>
+          </a:ln>
+        </p:spPr>
+        <p:style>
+          <a:lnRef idx="1">
+            <a:schemeClr val="accent1"/>
+          </a:lnRef>
+          <a:fillRef idx="0">
+            <a:schemeClr val="accent1"/>
+          </a:fillRef>
+          <a:effectRef idx="0">
+            <a:schemeClr val="accent1"/>
+          </a:effectRef>
+          <a:fontRef idx="minor">
+            <a:schemeClr val="tx1"/>
+          </a:fontRef>
+        </p:style>
+      </p:cxnSp>
+      <p:cxnSp>
+        <p:nvCxnSpPr>
+          <p:cNvPr id="29" name="Straight Connector 28"/>
+          <p:cNvCxnSpPr>
+            <a:stCxn id="14" idx="5"/>
+            <a:endCxn id="13" idx="1"/>
+          </p:cNvCxnSpPr>
+          <p:nvPr/>
+        </p:nvCxnSpPr>
+        <p:spPr>
+          <a:xfrm>
+            <a:off x="3009906" y="477306"/>
+            <a:ext cx="340177" cy="508127"/>
+          </a:xfrm>
+          <a:prstGeom prst="line">
+            <a:avLst/>
+          </a:prstGeom>
+          <a:ln w="25400">
+            <a:solidFill>
+              <a:schemeClr val="tx1"/>
+            </a:solidFill>
+          </a:ln>
+        </p:spPr>
+        <p:style>
+          <a:lnRef idx="1">
+            <a:schemeClr val="accent1"/>
+          </a:lnRef>
+          <a:fillRef idx="0">
+            <a:schemeClr val="accent1"/>
+          </a:fillRef>
+          <a:effectRef idx="0">
+            <a:schemeClr val="accent1"/>
+          </a:effectRef>
+          <a:fontRef idx="minor">
+            <a:schemeClr val="tx1"/>
+          </a:fontRef>
+        </p:style>
+      </p:cxnSp>
+      <p:cxnSp>
+        <p:nvCxnSpPr>
+          <p:cNvPr id="33" name="Straight Connector 32"/>
+          <p:cNvCxnSpPr>
+            <a:stCxn id="13" idx="2"/>
+            <a:endCxn id="12" idx="6"/>
+          </p:cNvCxnSpPr>
+          <p:nvPr/>
+        </p:nvCxnSpPr>
+        <p:spPr>
+          <a:xfrm flipH="1">
+            <a:off x="2629361" y="1010889"/>
+            <a:ext cx="710178" cy="4007"/>
+          </a:xfrm>
+          <a:prstGeom prst="line">
+            <a:avLst/>
+          </a:prstGeom>
+          <a:ln w="25400">
+            <a:solidFill>
+              <a:schemeClr val="tx1"/>
+            </a:solidFill>
+          </a:ln>
+        </p:spPr>
+        <p:style>
+          <a:lnRef idx="1">
+            <a:schemeClr val="accent1"/>
+          </a:lnRef>
+          <a:fillRef idx="0">
+            <a:schemeClr val="accent1"/>
+          </a:fillRef>
+          <a:effectRef idx="0">
+            <a:schemeClr val="accent1"/>
+          </a:effectRef>
+          <a:fontRef idx="minor">
+            <a:schemeClr val="tx1"/>
+          </a:fontRef>
+        </p:style>
+      </p:cxnSp>
+      <p:sp>
+        <p:nvSpPr>
+          <p:cNvPr id="39" name="Flussdiagramm: Verbinder 11">
+            <a:extLst>
+              <a:ext uri="{FF2B5EF4-FFF2-40B4-BE49-F238E27FC236}">
+                <a16:creationId xmlns:a16="http://schemas.microsoft.com/office/drawing/2014/main" id="{F60A3BDF-8B63-44B6-AAC1-D235B76343C4}"/>
+              </a:ext>
+            </a:extLst>
+          </p:cNvPr>
+          <p:cNvSpPr/>
+          <p:nvPr/>
+        </p:nvSpPr>
+        <p:spPr>
+          <a:xfrm>
+            <a:off x="2562156" y="1532286"/>
+            <a:ext cx="72000" cy="72000"/>
+          </a:xfrm>
+          <a:prstGeom prst="flowChartConnector">
+            <a:avLst/>
+          </a:prstGeom>
+          <a:solidFill>
+            <a:schemeClr val="tx1"/>
+          </a:solidFill>
+          <a:ln>
+            <a:solidFill>
+              <a:schemeClr val="tx1"/>
+            </a:solidFill>
+          </a:ln>
+        </p:spPr>
+        <p:style>
+          <a:lnRef idx="2">
+            <a:schemeClr val="accent1">
+              <a:shade val="50000"/>
+            </a:schemeClr>
+          </a:lnRef>
+          <a:fillRef idx="1">
+            <a:schemeClr val="accent1"/>
+          </a:fillRef>
+          <a:effectRef idx="0">
+            <a:schemeClr val="accent1"/>
+          </a:effectRef>
+          <a:fontRef idx="minor">
+            <a:schemeClr val="lt1"/>
+          </a:fontRef>
+        </p:style>
+        <p:txBody>
+          <a:bodyPr rtlCol="0" anchor="ctr"/>
+          <a:lstStyle/>
+          <a:p>
+            <a:pPr algn="ctr"/>
+            <a:endParaRPr lang="de-DE"/>
+          </a:p>
+        </p:txBody>
+      </p:sp>
+      <p:cxnSp>
+        <p:nvCxnSpPr>
+          <p:cNvPr id="41" name="Straight Connector 40"/>
+          <p:cNvCxnSpPr>
+            <a:stCxn id="39" idx="0"/>
+            <a:endCxn id="12" idx="4"/>
+          </p:cNvCxnSpPr>
+          <p:nvPr/>
+        </p:nvCxnSpPr>
+        <p:spPr>
+          <a:xfrm flipH="1" flipV="1">
+            <a:off x="2593361" y="1050896"/>
+            <a:ext cx="4795" cy="481390"/>
+          </a:xfrm>
+          <a:prstGeom prst="line">
+            <a:avLst/>
+          </a:prstGeom>
+          <a:ln w="25400">
+            <a:solidFill>
+              <a:schemeClr val="tx1"/>
+            </a:solidFill>
+          </a:ln>
+        </p:spPr>
+        <p:style>
+          <a:lnRef idx="1">
+            <a:schemeClr val="accent1"/>
+          </a:lnRef>
+          <a:fillRef idx="0">
+            <a:schemeClr val="accent1"/>
+          </a:fillRef>
+          <a:effectRef idx="0">
+            <a:schemeClr val="accent1"/>
+          </a:effectRef>
+          <a:fontRef idx="minor">
+            <a:schemeClr val="tx1"/>
+          </a:fontRef>
+        </p:style>
+      </p:cxnSp>
+      <p:sp>
+        <p:nvSpPr>
+          <p:cNvPr id="43" name="Flussdiagramm: Verbinder 11">
+            <a:extLst>
+              <a:ext uri="{FF2B5EF4-FFF2-40B4-BE49-F238E27FC236}">
+                <a16:creationId xmlns:a16="http://schemas.microsoft.com/office/drawing/2014/main" id="{F60A3BDF-8B63-44B6-AAC1-D235B76343C4}"/>
+              </a:ext>
+            </a:extLst>
+          </p:cNvPr>
+          <p:cNvSpPr/>
+          <p:nvPr/>
+        </p:nvSpPr>
+        <p:spPr>
+          <a:xfrm>
+            <a:off x="3346656" y="1532286"/>
+            <a:ext cx="72000" cy="72000"/>
+          </a:xfrm>
+          <a:prstGeom prst="flowChartConnector">
+            <a:avLst/>
+          </a:prstGeom>
+          <a:solidFill>
+            <a:schemeClr val="tx1"/>
+          </a:solidFill>
+          <a:ln>
+            <a:solidFill>
+              <a:schemeClr val="tx1"/>
+            </a:solidFill>
+          </a:ln>
+        </p:spPr>
+        <p:style>
+          <a:lnRef idx="2">
+            <a:schemeClr val="accent1">
+              <a:shade val="50000"/>
+            </a:schemeClr>
+          </a:lnRef>
+          <a:fillRef idx="1">
+            <a:schemeClr val="accent1"/>
+          </a:fillRef>
+          <a:effectRef idx="0">
+            <a:schemeClr val="accent1"/>
+          </a:effectRef>
+          <a:fontRef idx="minor">
+            <a:schemeClr val="lt1"/>
+          </a:fontRef>
+        </p:style>
+        <p:txBody>
+          <a:bodyPr rtlCol="0" anchor="ctr"/>
+          <a:lstStyle/>
+          <a:p>
+            <a:pPr algn="ctr"/>
+            <a:endParaRPr lang="de-DE"/>
+          </a:p>
+        </p:txBody>
+      </p:sp>
+      <p:cxnSp>
+        <p:nvCxnSpPr>
+          <p:cNvPr id="44" name="Straight Connector 43"/>
+          <p:cNvCxnSpPr>
+            <a:stCxn id="43" idx="0"/>
+            <a:endCxn id="13" idx="4"/>
+          </p:cNvCxnSpPr>
+          <p:nvPr/>
+        </p:nvCxnSpPr>
+        <p:spPr>
+          <a:xfrm flipH="1" flipV="1">
+            <a:off x="3375539" y="1046889"/>
+            <a:ext cx="7117" cy="485397"/>
+          </a:xfrm>
+          <a:prstGeom prst="line">
+            <a:avLst/>
+          </a:prstGeom>
+          <a:ln w="25400">
+            <a:solidFill>
+              <a:schemeClr val="tx1"/>
+            </a:solidFill>
+          </a:ln>
+        </p:spPr>
+        <p:style>
+          <a:lnRef idx="1">
+            <a:schemeClr val="accent1"/>
+          </a:lnRef>
+          <a:fillRef idx="0">
+            <a:schemeClr val="accent1"/>
+          </a:fillRef>
+          <a:effectRef idx="0">
+            <a:schemeClr val="accent1"/>
+          </a:effectRef>
+          <a:fontRef idx="minor">
+            <a:schemeClr val="tx1"/>
+          </a:fontRef>
+        </p:style>
+      </p:cxnSp>
+      <p:cxnSp>
+        <p:nvCxnSpPr>
+          <p:cNvPr id="45" name="Straight Connector 44"/>
+          <p:cNvCxnSpPr>
+            <a:stCxn id="43" idx="2"/>
+            <a:endCxn id="39" idx="6"/>
+          </p:cNvCxnSpPr>
+          <p:nvPr/>
+        </p:nvCxnSpPr>
+        <p:spPr>
+          <a:xfrm flipH="1">
+            <a:off x="2634156" y="1568286"/>
+            <a:ext cx="712500" cy="0"/>
+          </a:xfrm>
+          <a:prstGeom prst="line">
+            <a:avLst/>
+          </a:prstGeom>
+          <a:ln w="25400">
+            <a:solidFill>
+              <a:schemeClr val="tx1"/>
+            </a:solidFill>
+          </a:ln>
+        </p:spPr>
+        <p:style>
+          <a:lnRef idx="1">
+            <a:schemeClr val="accent1"/>
+          </a:lnRef>
+          <a:fillRef idx="0">
+            <a:schemeClr val="accent1"/>
+          </a:fillRef>
+          <a:effectRef idx="0">
+            <a:schemeClr val="accent1"/>
+          </a:effectRef>
+          <a:fontRef idx="minor">
+            <a:schemeClr val="tx1"/>
+          </a:fontRef>
+        </p:style>
+      </p:cxnSp>
+      <p:cxnSp>
+        <p:nvCxnSpPr>
+          <p:cNvPr id="53" name="Straight Connector 52"/>
+          <p:cNvCxnSpPr>
+            <a:stCxn id="39" idx="4"/>
+          </p:cNvCxnSpPr>
+          <p:nvPr/>
+        </p:nvCxnSpPr>
+        <p:spPr>
+          <a:xfrm>
+            <a:off x="2598156" y="1604286"/>
+            <a:ext cx="0" cy="307858"/>
+          </a:xfrm>
+          <a:prstGeom prst="line">
+            <a:avLst/>
+          </a:prstGeom>
+          <a:ln w="12700">
+            <a:solidFill>
+              <a:schemeClr val="tx1"/>
+            </a:solidFill>
+            <a:prstDash val="sysDot"/>
+          </a:ln>
+        </p:spPr>
+        <p:style>
+          <a:lnRef idx="1">
+            <a:schemeClr val="accent1"/>
+          </a:lnRef>
+          <a:fillRef idx="0">
+            <a:schemeClr val="accent1"/>
+          </a:fillRef>
+          <a:effectRef idx="0">
+            <a:schemeClr val="accent1"/>
+          </a:effectRef>
+          <a:fontRef idx="minor">
+            <a:schemeClr val="tx1"/>
+          </a:fontRef>
+        </p:style>
+      </p:cxnSp>
+      <p:cxnSp>
+        <p:nvCxnSpPr>
+          <p:cNvPr id="54" name="Straight Connector 53"/>
+          <p:cNvCxnSpPr>
+            <a:stCxn id="39" idx="2"/>
+          </p:cNvCxnSpPr>
+          <p:nvPr/>
+        </p:nvCxnSpPr>
+        <p:spPr>
+          <a:xfrm flipH="1">
+            <a:off x="2128393" y="1568286"/>
+            <a:ext cx="433763" cy="4007"/>
+          </a:xfrm>
+          <a:prstGeom prst="line">
+            <a:avLst/>
+          </a:prstGeom>
+          <a:ln w="12700">
+            <a:solidFill>
+              <a:schemeClr val="tx1"/>
+            </a:solidFill>
+            <a:prstDash val="sysDot"/>
+          </a:ln>
+        </p:spPr>
+        <p:style>
+          <a:lnRef idx="1">
+            <a:schemeClr val="accent1"/>
+          </a:lnRef>
+          <a:fillRef idx="0">
+            <a:schemeClr val="accent1"/>
+          </a:fillRef>
+          <a:effectRef idx="0">
+            <a:schemeClr val="accent1"/>
+          </a:effectRef>
+          <a:fontRef idx="minor">
+            <a:schemeClr val="tx1"/>
+          </a:fontRef>
+        </p:style>
+      </p:cxnSp>
     </p:spTree>
     <p:extLst>
       <p:ext uri="{BB962C8B-B14F-4D97-AF65-F5344CB8AC3E}">
@@ -4127,6 +4490,13 @@
   <p:clrMapOvr>
     <a:masterClrMapping/>
   </p:clrMapOvr>
+  <p:timing>
+    <p:tnLst>
+      <p:par>
+        <p:cTn id="1" dur="indefinite" restart="never" nodeType="tmRoot"/>
+      </p:par>
+    </p:tnLst>
+  </p:timing>
 </p:sld>
 </file>
 

</xml_diff>

<commit_message>
OL Push after Robert's Work
</commit_message>
<xml_diff>
--- a/img/CookieCAD.pptx
+++ b/img/CookieCAD.pptx
@@ -243,7 +243,7 @@
           <a:p>
             <a:fld id="{88D8086B-8956-4395-8472-C2A29D422F5B}" type="datetimeFigureOut">
               <a:rPr lang="de-DE" smtClean="0"/>
-              <a:t>03.07.2019</a:t>
+              <a:t>05.07.2019</a:t>
             </a:fld>
             <a:endParaRPr lang="de-DE"/>
           </a:p>
@@ -285,7 +285,7 @@
           <a:p>
             <a:fld id="{0B581A30-7E4F-4EB3-A199-549B1F26C1CE}" type="slidenum">
               <a:rPr lang="de-DE" smtClean="0"/>
-              <a:t>‹#›</a:t>
+              <a:t>‹Nr.›</a:t>
             </a:fld>
             <a:endParaRPr lang="de-DE"/>
           </a:p>
@@ -413,7 +413,7 @@
           <a:p>
             <a:fld id="{88D8086B-8956-4395-8472-C2A29D422F5B}" type="datetimeFigureOut">
               <a:rPr lang="de-DE" smtClean="0"/>
-              <a:t>03.07.2019</a:t>
+              <a:t>05.07.2019</a:t>
             </a:fld>
             <a:endParaRPr lang="de-DE"/>
           </a:p>
@@ -455,7 +455,7 @@
           <a:p>
             <a:fld id="{0B581A30-7E4F-4EB3-A199-549B1F26C1CE}" type="slidenum">
               <a:rPr lang="de-DE" smtClean="0"/>
-              <a:t>‹#›</a:t>
+              <a:t>‹Nr.›</a:t>
             </a:fld>
             <a:endParaRPr lang="de-DE"/>
           </a:p>
@@ -593,7 +593,7 @@
           <a:p>
             <a:fld id="{88D8086B-8956-4395-8472-C2A29D422F5B}" type="datetimeFigureOut">
               <a:rPr lang="de-DE" smtClean="0"/>
-              <a:t>03.07.2019</a:t>
+              <a:t>05.07.2019</a:t>
             </a:fld>
             <a:endParaRPr lang="de-DE"/>
           </a:p>
@@ -635,7 +635,7 @@
           <a:p>
             <a:fld id="{0B581A30-7E4F-4EB3-A199-549B1F26C1CE}" type="slidenum">
               <a:rPr lang="de-DE" smtClean="0"/>
-              <a:t>‹#›</a:t>
+              <a:t>‹Nr.›</a:t>
             </a:fld>
             <a:endParaRPr lang="de-DE"/>
           </a:p>
@@ -763,7 +763,7 @@
           <a:p>
             <a:fld id="{88D8086B-8956-4395-8472-C2A29D422F5B}" type="datetimeFigureOut">
               <a:rPr lang="de-DE" smtClean="0"/>
-              <a:t>03.07.2019</a:t>
+              <a:t>05.07.2019</a:t>
             </a:fld>
             <a:endParaRPr lang="de-DE"/>
           </a:p>
@@ -805,7 +805,7 @@
           <a:p>
             <a:fld id="{0B581A30-7E4F-4EB3-A199-549B1F26C1CE}" type="slidenum">
               <a:rPr lang="de-DE" smtClean="0"/>
-              <a:t>‹#›</a:t>
+              <a:t>‹Nr.›</a:t>
             </a:fld>
             <a:endParaRPr lang="de-DE"/>
           </a:p>
@@ -1009,7 +1009,7 @@
           <a:p>
             <a:fld id="{88D8086B-8956-4395-8472-C2A29D422F5B}" type="datetimeFigureOut">
               <a:rPr lang="de-DE" smtClean="0"/>
-              <a:t>03.07.2019</a:t>
+              <a:t>05.07.2019</a:t>
             </a:fld>
             <a:endParaRPr lang="de-DE"/>
           </a:p>
@@ -1051,7 +1051,7 @@
           <a:p>
             <a:fld id="{0B581A30-7E4F-4EB3-A199-549B1F26C1CE}" type="slidenum">
               <a:rPr lang="de-DE" smtClean="0"/>
-              <a:t>‹#›</a:t>
+              <a:t>‹Nr.›</a:t>
             </a:fld>
             <a:endParaRPr lang="de-DE"/>
           </a:p>
@@ -1241,7 +1241,7 @@
           <a:p>
             <a:fld id="{88D8086B-8956-4395-8472-C2A29D422F5B}" type="datetimeFigureOut">
               <a:rPr lang="de-DE" smtClean="0"/>
-              <a:t>03.07.2019</a:t>
+              <a:t>05.07.2019</a:t>
             </a:fld>
             <a:endParaRPr lang="de-DE"/>
           </a:p>
@@ -1283,7 +1283,7 @@
           <a:p>
             <a:fld id="{0B581A30-7E4F-4EB3-A199-549B1F26C1CE}" type="slidenum">
               <a:rPr lang="de-DE" smtClean="0"/>
-              <a:t>‹#›</a:t>
+              <a:t>‹Nr.›</a:t>
             </a:fld>
             <a:endParaRPr lang="de-DE"/>
           </a:p>
@@ -1608,7 +1608,7 @@
           <a:p>
             <a:fld id="{88D8086B-8956-4395-8472-C2A29D422F5B}" type="datetimeFigureOut">
               <a:rPr lang="de-DE" smtClean="0"/>
-              <a:t>03.07.2019</a:t>
+              <a:t>05.07.2019</a:t>
             </a:fld>
             <a:endParaRPr lang="de-DE"/>
           </a:p>
@@ -1650,7 +1650,7 @@
           <a:p>
             <a:fld id="{0B581A30-7E4F-4EB3-A199-549B1F26C1CE}" type="slidenum">
               <a:rPr lang="de-DE" smtClean="0"/>
-              <a:t>‹#›</a:t>
+              <a:t>‹Nr.›</a:t>
             </a:fld>
             <a:endParaRPr lang="de-DE"/>
           </a:p>
@@ -1726,7 +1726,7 @@
           <a:p>
             <a:fld id="{88D8086B-8956-4395-8472-C2A29D422F5B}" type="datetimeFigureOut">
               <a:rPr lang="de-DE" smtClean="0"/>
-              <a:t>03.07.2019</a:t>
+              <a:t>05.07.2019</a:t>
             </a:fld>
             <a:endParaRPr lang="de-DE"/>
           </a:p>
@@ -1768,7 +1768,7 @@
           <a:p>
             <a:fld id="{0B581A30-7E4F-4EB3-A199-549B1F26C1CE}" type="slidenum">
               <a:rPr lang="de-DE" smtClean="0"/>
-              <a:t>‹#›</a:t>
+              <a:t>‹Nr.›</a:t>
             </a:fld>
             <a:endParaRPr lang="de-DE"/>
           </a:p>
@@ -1821,7 +1821,7 @@
           <a:p>
             <a:fld id="{88D8086B-8956-4395-8472-C2A29D422F5B}" type="datetimeFigureOut">
               <a:rPr lang="de-DE" smtClean="0"/>
-              <a:t>03.07.2019</a:t>
+              <a:t>05.07.2019</a:t>
             </a:fld>
             <a:endParaRPr lang="de-DE"/>
           </a:p>
@@ -1863,7 +1863,7 @@
           <a:p>
             <a:fld id="{0B581A30-7E4F-4EB3-A199-549B1F26C1CE}" type="slidenum">
               <a:rPr lang="de-DE" smtClean="0"/>
-              <a:t>‹#›</a:t>
+              <a:t>‹Nr.›</a:t>
             </a:fld>
             <a:endParaRPr lang="de-DE"/>
           </a:p>
@@ -2098,7 +2098,7 @@
           <a:p>
             <a:fld id="{88D8086B-8956-4395-8472-C2A29D422F5B}" type="datetimeFigureOut">
               <a:rPr lang="de-DE" smtClean="0"/>
-              <a:t>03.07.2019</a:t>
+              <a:t>05.07.2019</a:t>
             </a:fld>
             <a:endParaRPr lang="de-DE"/>
           </a:p>
@@ -2140,7 +2140,7 @@
           <a:p>
             <a:fld id="{0B581A30-7E4F-4EB3-A199-549B1F26C1CE}" type="slidenum">
               <a:rPr lang="de-DE" smtClean="0"/>
-              <a:t>‹#›</a:t>
+              <a:t>‹Nr.›</a:t>
             </a:fld>
             <a:endParaRPr lang="de-DE"/>
           </a:p>
@@ -2355,7 +2355,7 @@
           <a:p>
             <a:fld id="{88D8086B-8956-4395-8472-C2A29D422F5B}" type="datetimeFigureOut">
               <a:rPr lang="de-DE" smtClean="0"/>
-              <a:t>03.07.2019</a:t>
+              <a:t>05.07.2019</a:t>
             </a:fld>
             <a:endParaRPr lang="de-DE"/>
           </a:p>
@@ -2397,7 +2397,7 @@
           <a:p>
             <a:fld id="{0B581A30-7E4F-4EB3-A199-549B1F26C1CE}" type="slidenum">
               <a:rPr lang="de-DE" smtClean="0"/>
-              <a:t>‹#›</a:t>
+              <a:t>‹Nr.›</a:t>
             </a:fld>
             <a:endParaRPr lang="de-DE"/>
           </a:p>
@@ -2568,7 +2568,7 @@
           <a:p>
             <a:fld id="{88D8086B-8956-4395-8472-C2A29D422F5B}" type="datetimeFigureOut">
               <a:rPr lang="de-DE" smtClean="0"/>
-              <a:t>03.07.2019</a:t>
+              <a:t>05.07.2019</a:t>
             </a:fld>
             <a:endParaRPr lang="de-DE"/>
           </a:p>
@@ -2646,7 +2646,7 @@
           <a:p>
             <a:fld id="{0B581A30-7E4F-4EB3-A199-549B1F26C1CE}" type="slidenum">
               <a:rPr lang="de-DE" smtClean="0"/>
-              <a:t>‹#›</a:t>
+              <a:t>‹Nr.›</a:t>
             </a:fld>
             <a:endParaRPr lang="de-DE"/>
           </a:p>
@@ -3692,168 +3692,6 @@
       </p:sp>
       <p:sp>
         <p:nvSpPr>
-          <p:cNvPr id="21" name="Flussdiagramm: Verbinder 20">
-            <a:extLst>
-              <a:ext uri="{FF2B5EF4-FFF2-40B4-BE49-F238E27FC236}">
-                <a16:creationId xmlns:a16="http://schemas.microsoft.com/office/drawing/2014/main" id="{422DB15A-0D6C-4F11-99E4-5DC9DCFD8E4C}"/>
-              </a:ext>
-            </a:extLst>
-          </p:cNvPr>
-          <p:cNvSpPr/>
-          <p:nvPr/>
-        </p:nvSpPr>
-        <p:spPr>
-          <a:xfrm>
-            <a:off x="4568146" y="1669459"/>
-            <a:ext cx="114300" cy="127516"/>
-          </a:xfrm>
-          <a:prstGeom prst="flowChartConnector">
-            <a:avLst/>
-          </a:prstGeom>
-          <a:solidFill>
-            <a:schemeClr val="tx1"/>
-          </a:solidFill>
-          <a:ln>
-            <a:solidFill>
-              <a:schemeClr val="tx1"/>
-            </a:solidFill>
-          </a:ln>
-        </p:spPr>
-        <p:style>
-          <a:lnRef idx="2">
-            <a:schemeClr val="accent1">
-              <a:shade val="50000"/>
-            </a:schemeClr>
-          </a:lnRef>
-          <a:fillRef idx="1">
-            <a:schemeClr val="accent1"/>
-          </a:fillRef>
-          <a:effectRef idx="0">
-            <a:schemeClr val="accent1"/>
-          </a:effectRef>
-          <a:fontRef idx="minor">
-            <a:schemeClr val="lt1"/>
-          </a:fontRef>
-        </p:style>
-        <p:txBody>
-          <a:bodyPr rtlCol="0" anchor="ctr"/>
-          <a:lstStyle/>
-          <a:p>
-            <a:pPr algn="ctr"/>
-            <a:endParaRPr lang="de-DE"/>
-          </a:p>
-        </p:txBody>
-      </p:sp>
-      <p:sp>
-        <p:nvSpPr>
-          <p:cNvPr id="22" name="Flussdiagramm: Verbinder 21">
-            <a:extLst>
-              <a:ext uri="{FF2B5EF4-FFF2-40B4-BE49-F238E27FC236}">
-                <a16:creationId xmlns:a16="http://schemas.microsoft.com/office/drawing/2014/main" id="{E86A3AB9-F7E6-4ABF-80E8-ABF66ABD2309}"/>
-              </a:ext>
-            </a:extLst>
-          </p:cNvPr>
-          <p:cNvSpPr/>
-          <p:nvPr/>
-        </p:nvSpPr>
-        <p:spPr>
-          <a:xfrm>
-            <a:off x="6101670" y="1685592"/>
-            <a:ext cx="114300" cy="127516"/>
-          </a:xfrm>
-          <a:prstGeom prst="flowChartConnector">
-            <a:avLst/>
-          </a:prstGeom>
-          <a:solidFill>
-            <a:schemeClr val="tx1"/>
-          </a:solidFill>
-          <a:ln>
-            <a:solidFill>
-              <a:schemeClr val="tx1"/>
-            </a:solidFill>
-          </a:ln>
-        </p:spPr>
-        <p:style>
-          <a:lnRef idx="2">
-            <a:schemeClr val="accent1">
-              <a:shade val="50000"/>
-            </a:schemeClr>
-          </a:lnRef>
-          <a:fillRef idx="1">
-            <a:schemeClr val="accent1"/>
-          </a:fillRef>
-          <a:effectRef idx="0">
-            <a:schemeClr val="accent1"/>
-          </a:effectRef>
-          <a:fontRef idx="minor">
-            <a:schemeClr val="lt1"/>
-          </a:fontRef>
-        </p:style>
-        <p:txBody>
-          <a:bodyPr rtlCol="0" anchor="ctr"/>
-          <a:lstStyle/>
-          <a:p>
-            <a:pPr algn="ctr"/>
-            <a:endParaRPr lang="de-DE"/>
-          </a:p>
-        </p:txBody>
-      </p:sp>
-      <p:sp>
-        <p:nvSpPr>
-          <p:cNvPr id="23" name="Flussdiagramm: Verbinder 22">
-            <a:extLst>
-              <a:ext uri="{FF2B5EF4-FFF2-40B4-BE49-F238E27FC236}">
-                <a16:creationId xmlns:a16="http://schemas.microsoft.com/office/drawing/2014/main" id="{01E9F6FE-53B7-41B1-90ED-C204CA1543E3}"/>
-              </a:ext>
-            </a:extLst>
-          </p:cNvPr>
-          <p:cNvSpPr/>
-          <p:nvPr/>
-        </p:nvSpPr>
-        <p:spPr>
-          <a:xfrm>
-            <a:off x="5334874" y="416921"/>
-            <a:ext cx="114300" cy="127516"/>
-          </a:xfrm>
-          <a:prstGeom prst="flowChartConnector">
-            <a:avLst/>
-          </a:prstGeom>
-          <a:solidFill>
-            <a:schemeClr val="tx1"/>
-          </a:solidFill>
-          <a:ln>
-            <a:solidFill>
-              <a:schemeClr val="tx1"/>
-            </a:solidFill>
-          </a:ln>
-        </p:spPr>
-        <p:style>
-          <a:lnRef idx="2">
-            <a:schemeClr val="accent1">
-              <a:shade val="50000"/>
-            </a:schemeClr>
-          </a:lnRef>
-          <a:fillRef idx="1">
-            <a:schemeClr val="accent1"/>
-          </a:fillRef>
-          <a:effectRef idx="0">
-            <a:schemeClr val="accent1"/>
-          </a:effectRef>
-          <a:fontRef idx="minor">
-            <a:schemeClr val="lt1"/>
-          </a:fontRef>
-        </p:style>
-        <p:txBody>
-          <a:bodyPr rtlCol="0" anchor="ctr"/>
-          <a:lstStyle/>
-          <a:p>
-            <a:pPr algn="ctr"/>
-            <a:endParaRPr lang="de-DE"/>
-          </a:p>
-        </p:txBody>
-      </p:sp>
-      <p:sp>
-        <p:nvSpPr>
           <p:cNvPr id="24" name="Gleichschenkliges Dreieck 23">
             <a:extLst>
               <a:ext uri="{FF2B5EF4-FFF2-40B4-BE49-F238E27FC236}">
@@ -3880,168 +3718,6 @@
             <a:prstDash val="solid"/>
           </a:ln>
           <a:effectLst/>
-        </p:spPr>
-        <p:style>
-          <a:lnRef idx="2">
-            <a:schemeClr val="accent1">
-              <a:shade val="50000"/>
-            </a:schemeClr>
-          </a:lnRef>
-          <a:fillRef idx="1">
-            <a:schemeClr val="accent1"/>
-          </a:fillRef>
-          <a:effectRef idx="0">
-            <a:schemeClr val="accent1"/>
-          </a:effectRef>
-          <a:fontRef idx="minor">
-            <a:schemeClr val="lt1"/>
-          </a:fontRef>
-        </p:style>
-        <p:txBody>
-          <a:bodyPr rtlCol="0" anchor="ctr"/>
-          <a:lstStyle/>
-          <a:p>
-            <a:pPr algn="ctr"/>
-            <a:endParaRPr lang="de-DE"/>
-          </a:p>
-        </p:txBody>
-      </p:sp>
-      <p:sp>
-        <p:nvSpPr>
-          <p:cNvPr id="25" name="Flussdiagramm: Verbinder 24">
-            <a:extLst>
-              <a:ext uri="{FF2B5EF4-FFF2-40B4-BE49-F238E27FC236}">
-                <a16:creationId xmlns:a16="http://schemas.microsoft.com/office/drawing/2014/main" id="{7926E930-0828-428A-9441-A82B14579ED1}"/>
-              </a:ext>
-            </a:extLst>
-          </p:cNvPr>
-          <p:cNvSpPr/>
-          <p:nvPr/>
-        </p:nvSpPr>
-        <p:spPr>
-          <a:xfrm>
-            <a:off x="6225496" y="568074"/>
-            <a:ext cx="114300" cy="127516"/>
-          </a:xfrm>
-          <a:prstGeom prst="flowChartConnector">
-            <a:avLst/>
-          </a:prstGeom>
-          <a:solidFill>
-            <a:schemeClr val="tx1"/>
-          </a:solidFill>
-          <a:ln>
-            <a:solidFill>
-              <a:schemeClr val="tx1"/>
-            </a:solidFill>
-          </a:ln>
-        </p:spPr>
-        <p:style>
-          <a:lnRef idx="2">
-            <a:schemeClr val="accent1">
-              <a:shade val="50000"/>
-            </a:schemeClr>
-          </a:lnRef>
-          <a:fillRef idx="1">
-            <a:schemeClr val="accent1"/>
-          </a:fillRef>
-          <a:effectRef idx="0">
-            <a:schemeClr val="accent1"/>
-          </a:effectRef>
-          <a:fontRef idx="minor">
-            <a:schemeClr val="lt1"/>
-          </a:fontRef>
-        </p:style>
-        <p:txBody>
-          <a:bodyPr rtlCol="0" anchor="ctr"/>
-          <a:lstStyle/>
-          <a:p>
-            <a:pPr algn="ctr"/>
-            <a:endParaRPr lang="de-DE"/>
-          </a:p>
-        </p:txBody>
-      </p:sp>
-      <p:sp>
-        <p:nvSpPr>
-          <p:cNvPr id="26" name="Flussdiagramm: Verbinder 25">
-            <a:extLst>
-              <a:ext uri="{FF2B5EF4-FFF2-40B4-BE49-F238E27FC236}">
-                <a16:creationId xmlns:a16="http://schemas.microsoft.com/office/drawing/2014/main" id="{12DD8186-BFED-42FE-A750-2E4F9B96D577}"/>
-              </a:ext>
-            </a:extLst>
-          </p:cNvPr>
-          <p:cNvSpPr/>
-          <p:nvPr/>
-        </p:nvSpPr>
-        <p:spPr>
-          <a:xfrm>
-            <a:off x="4858623" y="46518"/>
-            <a:ext cx="114300" cy="127516"/>
-          </a:xfrm>
-          <a:prstGeom prst="flowChartConnector">
-            <a:avLst/>
-          </a:prstGeom>
-          <a:solidFill>
-            <a:schemeClr val="tx1"/>
-          </a:solidFill>
-          <a:ln>
-            <a:solidFill>
-              <a:schemeClr val="tx1"/>
-            </a:solidFill>
-          </a:ln>
-        </p:spPr>
-        <p:style>
-          <a:lnRef idx="2">
-            <a:schemeClr val="accent1">
-              <a:shade val="50000"/>
-            </a:schemeClr>
-          </a:lnRef>
-          <a:fillRef idx="1">
-            <a:schemeClr val="accent1"/>
-          </a:fillRef>
-          <a:effectRef idx="0">
-            <a:schemeClr val="accent1"/>
-          </a:effectRef>
-          <a:fontRef idx="minor">
-            <a:schemeClr val="lt1"/>
-          </a:fontRef>
-        </p:style>
-        <p:txBody>
-          <a:bodyPr rtlCol="0" anchor="ctr"/>
-          <a:lstStyle/>
-          <a:p>
-            <a:pPr algn="ctr"/>
-            <a:endParaRPr lang="de-DE"/>
-          </a:p>
-        </p:txBody>
-      </p:sp>
-      <p:sp>
-        <p:nvSpPr>
-          <p:cNvPr id="27" name="Flussdiagramm: Verbinder 26">
-            <a:extLst>
-              <a:ext uri="{FF2B5EF4-FFF2-40B4-BE49-F238E27FC236}">
-                <a16:creationId xmlns:a16="http://schemas.microsoft.com/office/drawing/2014/main" id="{38D93265-BD2F-447E-834D-09A282170E97}"/>
-              </a:ext>
-            </a:extLst>
-          </p:cNvPr>
-          <p:cNvSpPr/>
-          <p:nvPr/>
-        </p:nvSpPr>
-        <p:spPr>
-          <a:xfrm>
-            <a:off x="5039678" y="1501462"/>
-            <a:ext cx="114300" cy="127516"/>
-          </a:xfrm>
-          <a:prstGeom prst="flowChartConnector">
-            <a:avLst/>
-          </a:prstGeom>
-          <a:solidFill>
-            <a:schemeClr val="tx1"/>
-          </a:solidFill>
-          <a:ln>
-            <a:solidFill>
-              <a:schemeClr val="tx1"/>
-            </a:solidFill>
-          </a:ln>
         </p:spPr>
         <p:style>
           <a:lnRef idx="2">
@@ -4480,6 +4156,330 @@
           </a:fontRef>
         </p:style>
       </p:cxnSp>
+      <p:sp>
+        <p:nvSpPr>
+          <p:cNvPr id="35" name="Flussdiagramm: Verbinder 34">
+            <a:extLst>
+              <a:ext uri="{FF2B5EF4-FFF2-40B4-BE49-F238E27FC236}">
+                <a16:creationId xmlns:a16="http://schemas.microsoft.com/office/drawing/2014/main" id="{34C438A6-1CC4-4143-8B43-BC2A43E9F682}"/>
+              </a:ext>
+            </a:extLst>
+          </p:cNvPr>
+          <p:cNvSpPr/>
+          <p:nvPr/>
+        </p:nvSpPr>
+        <p:spPr>
+          <a:xfrm>
+            <a:off x="4865070" y="63143"/>
+            <a:ext cx="72000" cy="72000"/>
+          </a:xfrm>
+          <a:prstGeom prst="flowChartConnector">
+            <a:avLst/>
+          </a:prstGeom>
+          <a:solidFill>
+            <a:schemeClr val="tx1"/>
+          </a:solidFill>
+          <a:ln>
+            <a:solidFill>
+              <a:schemeClr val="tx1"/>
+            </a:solidFill>
+          </a:ln>
+        </p:spPr>
+        <p:style>
+          <a:lnRef idx="2">
+            <a:schemeClr val="accent1">
+              <a:shade val="50000"/>
+            </a:schemeClr>
+          </a:lnRef>
+          <a:fillRef idx="1">
+            <a:schemeClr val="accent1"/>
+          </a:fillRef>
+          <a:effectRef idx="0">
+            <a:schemeClr val="accent1"/>
+          </a:effectRef>
+          <a:fontRef idx="minor">
+            <a:schemeClr val="lt1"/>
+          </a:fontRef>
+        </p:style>
+        <p:txBody>
+          <a:bodyPr rtlCol="0" anchor="ctr"/>
+          <a:lstStyle/>
+          <a:p>
+            <a:pPr algn="ctr"/>
+            <a:endParaRPr lang="de-DE"/>
+          </a:p>
+        </p:txBody>
+      </p:sp>
+      <p:sp>
+        <p:nvSpPr>
+          <p:cNvPr id="36" name="Flussdiagramm: Verbinder 35">
+            <a:extLst>
+              <a:ext uri="{FF2B5EF4-FFF2-40B4-BE49-F238E27FC236}">
+                <a16:creationId xmlns:a16="http://schemas.microsoft.com/office/drawing/2014/main" id="{FD7DB110-DD7C-4FBD-A539-70E87F663F12}"/>
+              </a:ext>
+            </a:extLst>
+          </p:cNvPr>
+          <p:cNvSpPr/>
+          <p:nvPr/>
+        </p:nvSpPr>
+        <p:spPr>
+          <a:xfrm>
+            <a:off x="5340006" y="431670"/>
+            <a:ext cx="72000" cy="72000"/>
+          </a:xfrm>
+          <a:prstGeom prst="flowChartConnector">
+            <a:avLst/>
+          </a:prstGeom>
+          <a:solidFill>
+            <a:schemeClr val="tx1"/>
+          </a:solidFill>
+          <a:ln>
+            <a:solidFill>
+              <a:schemeClr val="tx1"/>
+            </a:solidFill>
+          </a:ln>
+        </p:spPr>
+        <p:style>
+          <a:lnRef idx="2">
+            <a:schemeClr val="accent1">
+              <a:shade val="50000"/>
+            </a:schemeClr>
+          </a:lnRef>
+          <a:fillRef idx="1">
+            <a:schemeClr val="accent1"/>
+          </a:fillRef>
+          <a:effectRef idx="0">
+            <a:schemeClr val="accent1"/>
+          </a:effectRef>
+          <a:fontRef idx="minor">
+            <a:schemeClr val="lt1"/>
+          </a:fontRef>
+        </p:style>
+        <p:txBody>
+          <a:bodyPr rtlCol="0" anchor="ctr"/>
+          <a:lstStyle/>
+          <a:p>
+            <a:pPr algn="ctr"/>
+            <a:endParaRPr lang="de-DE"/>
+          </a:p>
+        </p:txBody>
+      </p:sp>
+      <p:sp>
+        <p:nvSpPr>
+          <p:cNvPr id="37" name="Flussdiagramm: Verbinder 36">
+            <a:extLst>
+              <a:ext uri="{FF2B5EF4-FFF2-40B4-BE49-F238E27FC236}">
+                <a16:creationId xmlns:a16="http://schemas.microsoft.com/office/drawing/2014/main" id="{376CE98B-1F8A-4799-ACA5-3A6AE3D0232D}"/>
+              </a:ext>
+            </a:extLst>
+          </p:cNvPr>
+          <p:cNvSpPr/>
+          <p:nvPr/>
+        </p:nvSpPr>
+        <p:spPr>
+          <a:xfrm>
+            <a:off x="6266571" y="584013"/>
+            <a:ext cx="72000" cy="72000"/>
+          </a:xfrm>
+          <a:prstGeom prst="flowChartConnector">
+            <a:avLst/>
+          </a:prstGeom>
+          <a:solidFill>
+            <a:schemeClr val="tx1"/>
+          </a:solidFill>
+          <a:ln>
+            <a:solidFill>
+              <a:schemeClr val="tx1"/>
+            </a:solidFill>
+          </a:ln>
+        </p:spPr>
+        <p:style>
+          <a:lnRef idx="2">
+            <a:schemeClr val="accent1">
+              <a:shade val="50000"/>
+            </a:schemeClr>
+          </a:lnRef>
+          <a:fillRef idx="1">
+            <a:schemeClr val="accent1"/>
+          </a:fillRef>
+          <a:effectRef idx="0">
+            <a:schemeClr val="accent1"/>
+          </a:effectRef>
+          <a:fontRef idx="minor">
+            <a:schemeClr val="lt1"/>
+          </a:fontRef>
+        </p:style>
+        <p:txBody>
+          <a:bodyPr rtlCol="0" anchor="ctr"/>
+          <a:lstStyle/>
+          <a:p>
+            <a:pPr algn="ctr"/>
+            <a:endParaRPr lang="de-DE"/>
+          </a:p>
+        </p:txBody>
+      </p:sp>
+      <p:sp>
+        <p:nvSpPr>
+          <p:cNvPr id="38" name="Flussdiagramm: Verbinder 37">
+            <a:extLst>
+              <a:ext uri="{FF2B5EF4-FFF2-40B4-BE49-F238E27FC236}">
+                <a16:creationId xmlns:a16="http://schemas.microsoft.com/office/drawing/2014/main" id="{AAE4CCE0-7E4C-4361-B1FB-6FCC82D65A0A}"/>
+              </a:ext>
+            </a:extLst>
+          </p:cNvPr>
+          <p:cNvSpPr/>
+          <p:nvPr/>
+        </p:nvSpPr>
+        <p:spPr>
+          <a:xfrm>
+            <a:off x="5046844" y="1562102"/>
+            <a:ext cx="72000" cy="72000"/>
+          </a:xfrm>
+          <a:prstGeom prst="flowChartConnector">
+            <a:avLst/>
+          </a:prstGeom>
+          <a:solidFill>
+            <a:schemeClr val="tx1"/>
+          </a:solidFill>
+          <a:ln>
+            <a:solidFill>
+              <a:schemeClr val="tx1"/>
+            </a:solidFill>
+          </a:ln>
+        </p:spPr>
+        <p:style>
+          <a:lnRef idx="2">
+            <a:schemeClr val="accent1">
+              <a:shade val="50000"/>
+            </a:schemeClr>
+          </a:lnRef>
+          <a:fillRef idx="1">
+            <a:schemeClr val="accent1"/>
+          </a:fillRef>
+          <a:effectRef idx="0">
+            <a:schemeClr val="accent1"/>
+          </a:effectRef>
+          <a:fontRef idx="minor">
+            <a:schemeClr val="lt1"/>
+          </a:fontRef>
+        </p:style>
+        <p:txBody>
+          <a:bodyPr rtlCol="0" anchor="ctr"/>
+          <a:lstStyle/>
+          <a:p>
+            <a:pPr algn="ctr"/>
+            <a:endParaRPr lang="de-DE"/>
+          </a:p>
+        </p:txBody>
+      </p:sp>
+      <p:sp>
+        <p:nvSpPr>
+          <p:cNvPr id="40" name="Flussdiagramm: Verbinder 39">
+            <a:extLst>
+              <a:ext uri="{FF2B5EF4-FFF2-40B4-BE49-F238E27FC236}">
+                <a16:creationId xmlns:a16="http://schemas.microsoft.com/office/drawing/2014/main" id="{9BE9F8BA-DD35-4F10-AEC8-5D33A7245C36}"/>
+              </a:ext>
+            </a:extLst>
+          </p:cNvPr>
+          <p:cNvSpPr/>
+          <p:nvPr/>
+        </p:nvSpPr>
+        <p:spPr>
+          <a:xfrm>
+            <a:off x="4556423" y="1714026"/>
+            <a:ext cx="72000" cy="72000"/>
+          </a:xfrm>
+          <a:prstGeom prst="flowChartConnector">
+            <a:avLst/>
+          </a:prstGeom>
+          <a:solidFill>
+            <a:schemeClr val="tx1"/>
+          </a:solidFill>
+          <a:ln>
+            <a:solidFill>
+              <a:schemeClr val="tx1"/>
+            </a:solidFill>
+          </a:ln>
+        </p:spPr>
+        <p:style>
+          <a:lnRef idx="2">
+            <a:schemeClr val="accent1">
+              <a:shade val="50000"/>
+            </a:schemeClr>
+          </a:lnRef>
+          <a:fillRef idx="1">
+            <a:schemeClr val="accent1"/>
+          </a:fillRef>
+          <a:effectRef idx="0">
+            <a:schemeClr val="accent1"/>
+          </a:effectRef>
+          <a:fontRef idx="minor">
+            <a:schemeClr val="lt1"/>
+          </a:fontRef>
+        </p:style>
+        <p:txBody>
+          <a:bodyPr rtlCol="0" anchor="ctr"/>
+          <a:lstStyle/>
+          <a:p>
+            <a:pPr algn="ctr"/>
+            <a:endParaRPr lang="de-DE"/>
+          </a:p>
+        </p:txBody>
+      </p:sp>
+      <p:sp>
+        <p:nvSpPr>
+          <p:cNvPr id="42" name="Flussdiagramm: Verbinder 41">
+            <a:extLst>
+              <a:ext uri="{FF2B5EF4-FFF2-40B4-BE49-F238E27FC236}">
+                <a16:creationId xmlns:a16="http://schemas.microsoft.com/office/drawing/2014/main" id="{1DF7D2AE-ACFE-4D03-A23B-CD013418AE9A}"/>
+              </a:ext>
+            </a:extLst>
+          </p:cNvPr>
+          <p:cNvSpPr/>
+          <p:nvPr/>
+        </p:nvSpPr>
+        <p:spPr>
+          <a:xfrm>
+            <a:off x="6120745" y="1708915"/>
+            <a:ext cx="72000" cy="72000"/>
+          </a:xfrm>
+          <a:prstGeom prst="flowChartConnector">
+            <a:avLst/>
+          </a:prstGeom>
+          <a:solidFill>
+            <a:schemeClr val="tx1"/>
+          </a:solidFill>
+          <a:ln>
+            <a:solidFill>
+              <a:schemeClr val="tx1"/>
+            </a:solidFill>
+          </a:ln>
+        </p:spPr>
+        <p:style>
+          <a:lnRef idx="2">
+            <a:schemeClr val="accent1">
+              <a:shade val="50000"/>
+            </a:schemeClr>
+          </a:lnRef>
+          <a:fillRef idx="1">
+            <a:schemeClr val="accent1"/>
+          </a:fillRef>
+          <a:effectRef idx="0">
+            <a:schemeClr val="accent1"/>
+          </a:effectRef>
+          <a:fontRef idx="minor">
+            <a:schemeClr val="lt1"/>
+          </a:fontRef>
+        </p:style>
+        <p:txBody>
+          <a:bodyPr rtlCol="0" anchor="ctr"/>
+          <a:lstStyle/>
+          <a:p>
+            <a:pPr algn="ctr"/>
+            <a:endParaRPr lang="de-DE"/>
+          </a:p>
+        </p:txBody>
+      </p:sp>
     </p:spTree>
     <p:extLst>
       <p:ext uri="{BB962C8B-B14F-4D97-AF65-F5344CB8AC3E}">
@@ -4490,13 +4490,6 @@
   <p:clrMapOvr>
     <a:masterClrMapping/>
   </p:clrMapOvr>
-  <p:timing>
-    <p:tnLst>
-      <p:par>
-        <p:cTn id="1" dur="indefinite" restart="never" nodeType="tmRoot"/>
-      </p:par>
-    </p:tnLst>
-  </p:timing>
 </p:sld>
 </file>
 

</xml_diff>

<commit_message>
- Rewrote Introduction - Copy/Paste Hans' email in Motivation Section - Finished Formalisation and Case Study
</commit_message>
<xml_diff>
--- a/img/CookieCAD.pptx
+++ b/img/CookieCAD.pptx
@@ -243,7 +243,7 @@
           <a:p>
             <a:fld id="{88D8086B-8956-4395-8472-C2A29D422F5B}" type="datetimeFigureOut">
               <a:rPr lang="de-DE" smtClean="0"/>
-              <a:t>05.07.2019</a:t>
+              <a:t>07.07.2019</a:t>
             </a:fld>
             <a:endParaRPr lang="de-DE"/>
           </a:p>
@@ -285,7 +285,7 @@
           <a:p>
             <a:fld id="{0B581A30-7E4F-4EB3-A199-549B1F26C1CE}" type="slidenum">
               <a:rPr lang="de-DE" smtClean="0"/>
-              <a:t>‹Nr.›</a:t>
+              <a:t>‹#›</a:t>
             </a:fld>
             <a:endParaRPr lang="de-DE"/>
           </a:p>
@@ -413,7 +413,7 @@
           <a:p>
             <a:fld id="{88D8086B-8956-4395-8472-C2A29D422F5B}" type="datetimeFigureOut">
               <a:rPr lang="de-DE" smtClean="0"/>
-              <a:t>05.07.2019</a:t>
+              <a:t>07.07.2019</a:t>
             </a:fld>
             <a:endParaRPr lang="de-DE"/>
           </a:p>
@@ -455,7 +455,7 @@
           <a:p>
             <a:fld id="{0B581A30-7E4F-4EB3-A199-549B1F26C1CE}" type="slidenum">
               <a:rPr lang="de-DE" smtClean="0"/>
-              <a:t>‹Nr.›</a:t>
+              <a:t>‹#›</a:t>
             </a:fld>
             <a:endParaRPr lang="de-DE"/>
           </a:p>
@@ -593,7 +593,7 @@
           <a:p>
             <a:fld id="{88D8086B-8956-4395-8472-C2A29D422F5B}" type="datetimeFigureOut">
               <a:rPr lang="de-DE" smtClean="0"/>
-              <a:t>05.07.2019</a:t>
+              <a:t>07.07.2019</a:t>
             </a:fld>
             <a:endParaRPr lang="de-DE"/>
           </a:p>
@@ -635,7 +635,7 @@
           <a:p>
             <a:fld id="{0B581A30-7E4F-4EB3-A199-549B1F26C1CE}" type="slidenum">
               <a:rPr lang="de-DE" smtClean="0"/>
-              <a:t>‹Nr.›</a:t>
+              <a:t>‹#›</a:t>
             </a:fld>
             <a:endParaRPr lang="de-DE"/>
           </a:p>
@@ -763,7 +763,7 @@
           <a:p>
             <a:fld id="{88D8086B-8956-4395-8472-C2A29D422F5B}" type="datetimeFigureOut">
               <a:rPr lang="de-DE" smtClean="0"/>
-              <a:t>05.07.2019</a:t>
+              <a:t>07.07.2019</a:t>
             </a:fld>
             <a:endParaRPr lang="de-DE"/>
           </a:p>
@@ -805,7 +805,7 @@
           <a:p>
             <a:fld id="{0B581A30-7E4F-4EB3-A199-549B1F26C1CE}" type="slidenum">
               <a:rPr lang="de-DE" smtClean="0"/>
-              <a:t>‹Nr.›</a:t>
+              <a:t>‹#›</a:t>
             </a:fld>
             <a:endParaRPr lang="de-DE"/>
           </a:p>
@@ -1009,7 +1009,7 @@
           <a:p>
             <a:fld id="{88D8086B-8956-4395-8472-C2A29D422F5B}" type="datetimeFigureOut">
               <a:rPr lang="de-DE" smtClean="0"/>
-              <a:t>05.07.2019</a:t>
+              <a:t>07.07.2019</a:t>
             </a:fld>
             <a:endParaRPr lang="de-DE"/>
           </a:p>
@@ -1051,7 +1051,7 @@
           <a:p>
             <a:fld id="{0B581A30-7E4F-4EB3-A199-549B1F26C1CE}" type="slidenum">
               <a:rPr lang="de-DE" smtClean="0"/>
-              <a:t>‹Nr.›</a:t>
+              <a:t>‹#›</a:t>
             </a:fld>
             <a:endParaRPr lang="de-DE"/>
           </a:p>
@@ -1241,7 +1241,7 @@
           <a:p>
             <a:fld id="{88D8086B-8956-4395-8472-C2A29D422F5B}" type="datetimeFigureOut">
               <a:rPr lang="de-DE" smtClean="0"/>
-              <a:t>05.07.2019</a:t>
+              <a:t>07.07.2019</a:t>
             </a:fld>
             <a:endParaRPr lang="de-DE"/>
           </a:p>
@@ -1283,7 +1283,7 @@
           <a:p>
             <a:fld id="{0B581A30-7E4F-4EB3-A199-549B1F26C1CE}" type="slidenum">
               <a:rPr lang="de-DE" smtClean="0"/>
-              <a:t>‹Nr.›</a:t>
+              <a:t>‹#›</a:t>
             </a:fld>
             <a:endParaRPr lang="de-DE"/>
           </a:p>
@@ -1608,7 +1608,7 @@
           <a:p>
             <a:fld id="{88D8086B-8956-4395-8472-C2A29D422F5B}" type="datetimeFigureOut">
               <a:rPr lang="de-DE" smtClean="0"/>
-              <a:t>05.07.2019</a:t>
+              <a:t>07.07.2019</a:t>
             </a:fld>
             <a:endParaRPr lang="de-DE"/>
           </a:p>
@@ -1650,7 +1650,7 @@
           <a:p>
             <a:fld id="{0B581A30-7E4F-4EB3-A199-549B1F26C1CE}" type="slidenum">
               <a:rPr lang="de-DE" smtClean="0"/>
-              <a:t>‹Nr.›</a:t>
+              <a:t>‹#›</a:t>
             </a:fld>
             <a:endParaRPr lang="de-DE"/>
           </a:p>
@@ -1726,7 +1726,7 @@
           <a:p>
             <a:fld id="{88D8086B-8956-4395-8472-C2A29D422F5B}" type="datetimeFigureOut">
               <a:rPr lang="de-DE" smtClean="0"/>
-              <a:t>05.07.2019</a:t>
+              <a:t>07.07.2019</a:t>
             </a:fld>
             <a:endParaRPr lang="de-DE"/>
           </a:p>
@@ -1768,7 +1768,7 @@
           <a:p>
             <a:fld id="{0B581A30-7E4F-4EB3-A199-549B1F26C1CE}" type="slidenum">
               <a:rPr lang="de-DE" smtClean="0"/>
-              <a:t>‹Nr.›</a:t>
+              <a:t>‹#›</a:t>
             </a:fld>
             <a:endParaRPr lang="de-DE"/>
           </a:p>
@@ -1821,7 +1821,7 @@
           <a:p>
             <a:fld id="{88D8086B-8956-4395-8472-C2A29D422F5B}" type="datetimeFigureOut">
               <a:rPr lang="de-DE" smtClean="0"/>
-              <a:t>05.07.2019</a:t>
+              <a:t>07.07.2019</a:t>
             </a:fld>
             <a:endParaRPr lang="de-DE"/>
           </a:p>
@@ -1863,7 +1863,7 @@
           <a:p>
             <a:fld id="{0B581A30-7E4F-4EB3-A199-549B1F26C1CE}" type="slidenum">
               <a:rPr lang="de-DE" smtClean="0"/>
-              <a:t>‹Nr.›</a:t>
+              <a:t>‹#›</a:t>
             </a:fld>
             <a:endParaRPr lang="de-DE"/>
           </a:p>
@@ -2098,7 +2098,7 @@
           <a:p>
             <a:fld id="{88D8086B-8956-4395-8472-C2A29D422F5B}" type="datetimeFigureOut">
               <a:rPr lang="de-DE" smtClean="0"/>
-              <a:t>05.07.2019</a:t>
+              <a:t>07.07.2019</a:t>
             </a:fld>
             <a:endParaRPr lang="de-DE"/>
           </a:p>
@@ -2140,7 +2140,7 @@
           <a:p>
             <a:fld id="{0B581A30-7E4F-4EB3-A199-549B1F26C1CE}" type="slidenum">
               <a:rPr lang="de-DE" smtClean="0"/>
-              <a:t>‹Nr.›</a:t>
+              <a:t>‹#›</a:t>
             </a:fld>
             <a:endParaRPr lang="de-DE"/>
           </a:p>
@@ -2355,7 +2355,7 @@
           <a:p>
             <a:fld id="{88D8086B-8956-4395-8472-C2A29D422F5B}" type="datetimeFigureOut">
               <a:rPr lang="de-DE" smtClean="0"/>
-              <a:t>05.07.2019</a:t>
+              <a:t>07.07.2019</a:t>
             </a:fld>
             <a:endParaRPr lang="de-DE"/>
           </a:p>
@@ -2397,7 +2397,7 @@
           <a:p>
             <a:fld id="{0B581A30-7E4F-4EB3-A199-549B1F26C1CE}" type="slidenum">
               <a:rPr lang="de-DE" smtClean="0"/>
-              <a:t>‹Nr.›</a:t>
+              <a:t>‹#›</a:t>
             </a:fld>
             <a:endParaRPr lang="de-DE"/>
           </a:p>
@@ -2568,7 +2568,7 @@
           <a:p>
             <a:fld id="{88D8086B-8956-4395-8472-C2A29D422F5B}" type="datetimeFigureOut">
               <a:rPr lang="de-DE" smtClean="0"/>
-              <a:t>05.07.2019</a:t>
+              <a:t>07.07.2019</a:t>
             </a:fld>
             <a:endParaRPr lang="de-DE"/>
           </a:p>
@@ -2646,7 +2646,7 @@
           <a:p>
             <a:fld id="{0B581A30-7E4F-4EB3-A199-549B1F26C1CE}" type="slidenum">
               <a:rPr lang="de-DE" smtClean="0"/>
-              <a:t>‹Nr.›</a:t>
+              <a:t>‹#›</a:t>
             </a:fld>
             <a:endParaRPr lang="de-DE"/>
           </a:p>
@@ -2975,65 +2975,6 @@
       </p:grpSpPr>
       <p:sp>
         <p:nvSpPr>
-          <p:cNvPr id="4" name="Gleichschenkliges Dreieck 3">
-            <a:extLst>
-              <a:ext uri="{FF2B5EF4-FFF2-40B4-BE49-F238E27FC236}">
-                <a16:creationId xmlns:a16="http://schemas.microsoft.com/office/drawing/2014/main" id="{F3F4C3AC-DF28-4808-B8DA-27338644F125}"/>
-              </a:ext>
-            </a:extLst>
-          </p:cNvPr>
-          <p:cNvSpPr/>
-          <p:nvPr/>
-        </p:nvSpPr>
-        <p:spPr>
-          <a:xfrm>
-            <a:off x="110445" y="453950"/>
-            <a:ext cx="1562100" cy="1285875"/>
-          </a:xfrm>
-          <a:prstGeom prst="triangle">
-            <a:avLst/>
-          </a:prstGeom>
-          <a:noFill/>
-          <a:ln w="25400">
-            <a:solidFill>
-              <a:schemeClr val="bg1">
-                <a:lumMod val="50000"/>
-              </a:schemeClr>
-            </a:solidFill>
-          </a:ln>
-          <a:effectLst>
-            <a:outerShdw blurRad="50800" dist="50800" dir="2400000" sx="102000" sy="102000" algn="ctr" rotWithShape="0">
-              <a:schemeClr val="tx1"/>
-            </a:outerShdw>
-          </a:effectLst>
-        </p:spPr>
-        <p:style>
-          <a:lnRef idx="2">
-            <a:schemeClr val="accent1">
-              <a:shade val="50000"/>
-            </a:schemeClr>
-          </a:lnRef>
-          <a:fillRef idx="1">
-            <a:schemeClr val="accent1"/>
-          </a:fillRef>
-          <a:effectRef idx="0">
-            <a:schemeClr val="accent1"/>
-          </a:effectRef>
-          <a:fontRef idx="minor">
-            <a:schemeClr val="lt1"/>
-          </a:fontRef>
-        </p:style>
-        <p:txBody>
-          <a:bodyPr rtlCol="0" anchor="ctr"/>
-          <a:lstStyle/>
-          <a:p>
-            <a:pPr algn="ctr"/>
-            <a:endParaRPr lang="de-DE"/>
-          </a:p>
-        </p:txBody>
-      </p:sp>
-      <p:sp>
-        <p:nvSpPr>
           <p:cNvPr id="5" name="Textfeld 4">
             <a:extLst>
               <a:ext uri="{FF2B5EF4-FFF2-40B4-BE49-F238E27FC236}">
@@ -4480,6 +4421,36 @@
           </a:p>
         </p:txBody>
       </p:sp>
+      <p:pic>
+        <p:nvPicPr>
+          <p:cNvPr id="2" name="Picture 1"/>
+          <p:cNvPicPr>
+            <a:picLocks noChangeAspect="1"/>
+          </p:cNvPicPr>
+          <p:nvPr/>
+        </p:nvPicPr>
+        <p:blipFill>
+          <a:blip r:embed="rId2">
+            <a:extLst>
+              <a:ext uri="{28A0092B-C50C-407E-A947-70E740481C1C}">
+                <a14:useLocalDpi xmlns:a14="http://schemas.microsoft.com/office/drawing/2010/main" val="0"/>
+              </a:ext>
+            </a:extLst>
+          </a:blip>
+          <a:stretch>
+            <a:fillRect/>
+          </a:stretch>
+        </p:blipFill>
+        <p:spPr>
+          <a:xfrm>
+            <a:off x="77388" y="288779"/>
+            <a:ext cx="1683962" cy="1683962"/>
+          </a:xfrm>
+          <a:prstGeom prst="rect">
+            <a:avLst/>
+          </a:prstGeom>
+        </p:spPr>
+      </p:pic>
     </p:spTree>
     <p:extLst>
       <p:ext uri="{BB962C8B-B14F-4D97-AF65-F5344CB8AC3E}">
@@ -4490,6 +4461,13 @@
   <p:clrMapOvr>
     <a:masterClrMapping/>
   </p:clrMapOvr>
+  <p:timing>
+    <p:tnLst>
+      <p:par>
+        <p:cTn id="1" dur="indefinite" restart="never" nodeType="tmRoot"/>
+      </p:par>
+    </p:tnLst>
+  </p:timing>
 </p:sld>
 </file>
 

</xml_diff>

<commit_message>
LAst modifications by Robert, Andreas and Dominique
</commit_message>
<xml_diff>
--- a/img/CookieCAD.pptx
+++ b/img/CookieCAD.pptx
@@ -285,7 +285,7 @@
           <a:p>
             <a:fld id="{0B581A30-7E4F-4EB3-A199-549B1F26C1CE}" type="slidenum">
               <a:rPr lang="de-DE" smtClean="0"/>
-              <a:t>‹#›</a:t>
+              <a:t>‹Nr.›</a:t>
             </a:fld>
             <a:endParaRPr lang="de-DE"/>
           </a:p>
@@ -455,7 +455,7 @@
           <a:p>
             <a:fld id="{0B581A30-7E4F-4EB3-A199-549B1F26C1CE}" type="slidenum">
               <a:rPr lang="de-DE" smtClean="0"/>
-              <a:t>‹#›</a:t>
+              <a:t>‹Nr.›</a:t>
             </a:fld>
             <a:endParaRPr lang="de-DE"/>
           </a:p>
@@ -635,7 +635,7 @@
           <a:p>
             <a:fld id="{0B581A30-7E4F-4EB3-A199-549B1F26C1CE}" type="slidenum">
               <a:rPr lang="de-DE" smtClean="0"/>
-              <a:t>‹#›</a:t>
+              <a:t>‹Nr.›</a:t>
             </a:fld>
             <a:endParaRPr lang="de-DE"/>
           </a:p>
@@ -805,7 +805,7 @@
           <a:p>
             <a:fld id="{0B581A30-7E4F-4EB3-A199-549B1F26C1CE}" type="slidenum">
               <a:rPr lang="de-DE" smtClean="0"/>
-              <a:t>‹#›</a:t>
+              <a:t>‹Nr.›</a:t>
             </a:fld>
             <a:endParaRPr lang="de-DE"/>
           </a:p>
@@ -1051,7 +1051,7 @@
           <a:p>
             <a:fld id="{0B581A30-7E4F-4EB3-A199-549B1F26C1CE}" type="slidenum">
               <a:rPr lang="de-DE" smtClean="0"/>
-              <a:t>‹#›</a:t>
+              <a:t>‹Nr.›</a:t>
             </a:fld>
             <a:endParaRPr lang="de-DE"/>
           </a:p>
@@ -1283,7 +1283,7 @@
           <a:p>
             <a:fld id="{0B581A30-7E4F-4EB3-A199-549B1F26C1CE}" type="slidenum">
               <a:rPr lang="de-DE" smtClean="0"/>
-              <a:t>‹#›</a:t>
+              <a:t>‹Nr.›</a:t>
             </a:fld>
             <a:endParaRPr lang="de-DE"/>
           </a:p>
@@ -1650,7 +1650,7 @@
           <a:p>
             <a:fld id="{0B581A30-7E4F-4EB3-A199-549B1F26C1CE}" type="slidenum">
               <a:rPr lang="de-DE" smtClean="0"/>
-              <a:t>‹#›</a:t>
+              <a:t>‹Nr.›</a:t>
             </a:fld>
             <a:endParaRPr lang="de-DE"/>
           </a:p>
@@ -1768,7 +1768,7 @@
           <a:p>
             <a:fld id="{0B581A30-7E4F-4EB3-A199-549B1F26C1CE}" type="slidenum">
               <a:rPr lang="de-DE" smtClean="0"/>
-              <a:t>‹#›</a:t>
+              <a:t>‹Nr.›</a:t>
             </a:fld>
             <a:endParaRPr lang="de-DE"/>
           </a:p>
@@ -1863,7 +1863,7 @@
           <a:p>
             <a:fld id="{0B581A30-7E4F-4EB3-A199-549B1F26C1CE}" type="slidenum">
               <a:rPr lang="de-DE" smtClean="0"/>
-              <a:t>‹#›</a:t>
+              <a:t>‹Nr.›</a:t>
             </a:fld>
             <a:endParaRPr lang="de-DE"/>
           </a:p>
@@ -2140,7 +2140,7 @@
           <a:p>
             <a:fld id="{0B581A30-7E4F-4EB3-A199-549B1F26C1CE}" type="slidenum">
               <a:rPr lang="de-DE" smtClean="0"/>
-              <a:t>‹#›</a:t>
+              <a:t>‹Nr.›</a:t>
             </a:fld>
             <a:endParaRPr lang="de-DE"/>
           </a:p>
@@ -2397,7 +2397,7 @@
           <a:p>
             <a:fld id="{0B581A30-7E4F-4EB3-A199-549B1F26C1CE}" type="slidenum">
               <a:rPr lang="de-DE" smtClean="0"/>
-              <a:t>‹#›</a:t>
+              <a:t>‹Nr.›</a:t>
             </a:fld>
             <a:endParaRPr lang="de-DE"/>
           </a:p>
@@ -2646,7 +2646,7 @@
           <a:p>
             <a:fld id="{0B581A30-7E4F-4EB3-A199-549B1F26C1CE}" type="slidenum">
               <a:rPr lang="de-DE" smtClean="0"/>
-              <a:t>‹#›</a:t>
+              <a:t>‹Nr.›</a:t>
             </a:fld>
             <a:endParaRPr lang="de-DE"/>
           </a:p>
@@ -4423,7 +4423,13 @@
       </p:sp>
       <p:pic>
         <p:nvPicPr>
-          <p:cNvPr id="2" name="Picture 1"/>
+          <p:cNvPr id="11" name="Grafik 10">
+            <a:extLst>
+              <a:ext uri="{FF2B5EF4-FFF2-40B4-BE49-F238E27FC236}">
+                <a16:creationId xmlns:a16="http://schemas.microsoft.com/office/drawing/2014/main" id="{B41E47C2-8F6F-4596-8CE2-09CDA2027EF6}"/>
+              </a:ext>
+            </a:extLst>
+          </p:cNvPr>
           <p:cNvPicPr>
             <a:picLocks noChangeAspect="1"/>
           </p:cNvPicPr>
@@ -4443,8 +4449,8 @@
         </p:blipFill>
         <p:spPr>
           <a:xfrm>
-            <a:off x="77388" y="288779"/>
-            <a:ext cx="1683962" cy="1683962"/>
+            <a:off x="157654" y="342117"/>
+            <a:ext cx="1577286" cy="1577286"/>
           </a:xfrm>
           <a:prstGeom prst="rect">
             <a:avLst/>
@@ -4461,13 +4467,6 @@
   <p:clrMapOvr>
     <a:masterClrMapping/>
   </p:clrMapOvr>
-  <p:timing>
-    <p:tnLst>
-      <p:par>
-        <p:cTn id="1" dur="indefinite" restart="never" nodeType="tmRoot"/>
-      </p:par>
-    </p:tnLst>
-  </p:timing>
 </p:sld>
 </file>
 

</xml_diff>